<commit_message>
Added the table with the xgboost final configuration
</commit_message>
<xml_diff>
--- a/tmp_resources/table_template.pptx
+++ b/tmp_resources/table_template.pptx
@@ -112,14 +112,6 @@
 </p:presentation>
 </file>
 
-<file path=ppt/revisionInfo.xml><?xml version="1.0" encoding="utf-8"?>
-<p1510:revInfo xmlns:a="http://schemas.openxmlformats.org/drawingml/2006/main" xmlns:r="http://schemas.openxmlformats.org/officeDocument/2006/relationships" xmlns:p1510="http://schemas.microsoft.com/office/powerpoint/2015/10/main">
-  <p1510:revLst>
-    <p1510:client id="{4FE2BEEA-55F3-417A-8FD5-E04C968B28F1}" v="53" dt="2025-05-14T08:11:36.154"/>
-  </p1510:revLst>
-</p1510:revInfo>
-</file>
-
 <file path=ppt/changesInfos/changesInfo1.xml><?xml version="1.0" encoding="utf-8"?>
 <pc:chgInfo xmlns:a="http://schemas.openxmlformats.org/drawingml/2006/main" xmlns:r="http://schemas.openxmlformats.org/officeDocument/2006/relationships" xmlns:ac="http://schemas.microsoft.com/office/drawing/2013/main/command" xmlns:pc="http://schemas.microsoft.com/office/powerpoint/2013/main/command">
   <pc:docChgLst>
@@ -173,18 +165,18 @@
   <pc:docChgLst>
     <pc:chgData name="Fatima Pillosu" userId="a6295d4dc9e22643" providerId="LiveId" clId="{A306C549-9947-470A-BD42-4E3707CDB1C5}"/>
     <pc:docChg chg="modSld">
-      <pc:chgData name="Fatima Pillosu" userId="a6295d4dc9e22643" providerId="LiveId" clId="{A306C549-9947-470A-BD42-4E3707CDB1C5}" dt="2025-05-14T11:23:06.079" v="16" actId="20577"/>
+      <pc:chgData name="Fatima Pillosu" userId="a6295d4dc9e22643" providerId="LiveId" clId="{A306C549-9947-470A-BD42-4E3707CDB1C5}" dt="2025-05-29T20:05:10.491" v="60" actId="20577"/>
       <pc:docMkLst>
         <pc:docMk/>
       </pc:docMkLst>
       <pc:sldChg chg="modSp mod">
-        <pc:chgData name="Fatima Pillosu" userId="a6295d4dc9e22643" providerId="LiveId" clId="{A306C549-9947-470A-BD42-4E3707CDB1C5}" dt="2025-05-14T11:23:06.079" v="16" actId="20577"/>
+        <pc:chgData name="Fatima Pillosu" userId="a6295d4dc9e22643" providerId="LiveId" clId="{A306C549-9947-470A-BD42-4E3707CDB1C5}" dt="2025-05-29T20:05:10.491" v="60" actId="20577"/>
         <pc:sldMkLst>
           <pc:docMk/>
           <pc:sldMk cId="3020345181" sldId="257"/>
         </pc:sldMkLst>
         <pc:graphicFrameChg chg="modGraphic">
-          <ac:chgData name="Fatima Pillosu" userId="a6295d4dc9e22643" providerId="LiveId" clId="{A306C549-9947-470A-BD42-4E3707CDB1C5}" dt="2025-05-14T11:23:06.079" v="16" actId="20577"/>
+          <ac:chgData name="Fatima Pillosu" userId="a6295d4dc9e22643" providerId="LiveId" clId="{A306C549-9947-470A-BD42-4E3707CDB1C5}" dt="2025-05-29T20:05:10.491" v="60" actId="20577"/>
           <ac:graphicFrameMkLst>
             <pc:docMk/>
             <pc:sldMk cId="3020345181" sldId="257"/>
@@ -328,7 +320,7 @@
           <a:p>
             <a:fld id="{1FB3EBC5-2BAE-4ECB-A995-B52653FE7498}" type="datetimeFigureOut">
               <a:rPr lang="en-GB" smtClean="0"/>
-              <a:t>14/05/2025</a:t>
+              <a:t>29/05/2025</a:t>
             </a:fld>
             <a:endParaRPr lang="en-GB"/>
           </a:p>
@@ -498,7 +490,7 @@
           <a:p>
             <a:fld id="{1FB3EBC5-2BAE-4ECB-A995-B52653FE7498}" type="datetimeFigureOut">
               <a:rPr lang="en-GB" smtClean="0"/>
-              <a:t>14/05/2025</a:t>
+              <a:t>29/05/2025</a:t>
             </a:fld>
             <a:endParaRPr lang="en-GB"/>
           </a:p>
@@ -678,7 +670,7 @@
           <a:p>
             <a:fld id="{1FB3EBC5-2BAE-4ECB-A995-B52653FE7498}" type="datetimeFigureOut">
               <a:rPr lang="en-GB" smtClean="0"/>
-              <a:t>14/05/2025</a:t>
+              <a:t>29/05/2025</a:t>
             </a:fld>
             <a:endParaRPr lang="en-GB"/>
           </a:p>
@@ -848,7 +840,7 @@
           <a:p>
             <a:fld id="{1FB3EBC5-2BAE-4ECB-A995-B52653FE7498}" type="datetimeFigureOut">
               <a:rPr lang="en-GB" smtClean="0"/>
-              <a:t>14/05/2025</a:t>
+              <a:t>29/05/2025</a:t>
             </a:fld>
             <a:endParaRPr lang="en-GB"/>
           </a:p>
@@ -1094,7 +1086,7 @@
           <a:p>
             <a:fld id="{1FB3EBC5-2BAE-4ECB-A995-B52653FE7498}" type="datetimeFigureOut">
               <a:rPr lang="en-GB" smtClean="0"/>
-              <a:t>14/05/2025</a:t>
+              <a:t>29/05/2025</a:t>
             </a:fld>
             <a:endParaRPr lang="en-GB"/>
           </a:p>
@@ -1326,7 +1318,7 @@
           <a:p>
             <a:fld id="{1FB3EBC5-2BAE-4ECB-A995-B52653FE7498}" type="datetimeFigureOut">
               <a:rPr lang="en-GB" smtClean="0"/>
-              <a:t>14/05/2025</a:t>
+              <a:t>29/05/2025</a:t>
             </a:fld>
             <a:endParaRPr lang="en-GB"/>
           </a:p>
@@ -1693,7 +1685,7 @@
           <a:p>
             <a:fld id="{1FB3EBC5-2BAE-4ECB-A995-B52653FE7498}" type="datetimeFigureOut">
               <a:rPr lang="en-GB" smtClean="0"/>
-              <a:t>14/05/2025</a:t>
+              <a:t>29/05/2025</a:t>
             </a:fld>
             <a:endParaRPr lang="en-GB"/>
           </a:p>
@@ -1811,7 +1803,7 @@
           <a:p>
             <a:fld id="{1FB3EBC5-2BAE-4ECB-A995-B52653FE7498}" type="datetimeFigureOut">
               <a:rPr lang="en-GB" smtClean="0"/>
-              <a:t>14/05/2025</a:t>
+              <a:t>29/05/2025</a:t>
             </a:fld>
             <a:endParaRPr lang="en-GB"/>
           </a:p>
@@ -1906,7 +1898,7 @@
           <a:p>
             <a:fld id="{1FB3EBC5-2BAE-4ECB-A995-B52653FE7498}" type="datetimeFigureOut">
               <a:rPr lang="en-GB" smtClean="0"/>
-              <a:t>14/05/2025</a:t>
+              <a:t>29/05/2025</a:t>
             </a:fld>
             <a:endParaRPr lang="en-GB"/>
           </a:p>
@@ -2183,7 +2175,7 @@
           <a:p>
             <a:fld id="{1FB3EBC5-2BAE-4ECB-A995-B52653FE7498}" type="datetimeFigureOut">
               <a:rPr lang="en-GB" smtClean="0"/>
-              <a:t>14/05/2025</a:t>
+              <a:t>29/05/2025</a:t>
             </a:fld>
             <a:endParaRPr lang="en-GB"/>
           </a:p>
@@ -2440,7 +2432,7 @@
           <a:p>
             <a:fld id="{1FB3EBC5-2BAE-4ECB-A995-B52653FE7498}" type="datetimeFigureOut">
               <a:rPr lang="en-GB" smtClean="0"/>
-              <a:t>14/05/2025</a:t>
+              <a:t>29/05/2025</a:t>
             </a:fld>
             <a:endParaRPr lang="en-GB"/>
           </a:p>
@@ -2653,7 +2645,7 @@
           <a:p>
             <a:fld id="{1FB3EBC5-2BAE-4ECB-A995-B52653FE7498}" type="datetimeFigureOut">
               <a:rPr lang="en-GB" smtClean="0"/>
-              <a:t>14/05/2025</a:t>
+              <a:t>29/05/2025</a:t>
             </a:fld>
             <a:endParaRPr lang="en-GB"/>
           </a:p>
@@ -3073,7 +3065,7 @@
           <p:nvPr>
             <p:extLst>
               <p:ext uri="{D42A27DB-BD31-4B8C-83A1-F6EECF244321}">
-                <p14:modId xmlns:p14="http://schemas.microsoft.com/office/powerpoint/2010/main" val="2238208842"/>
+                <p14:modId xmlns:p14="http://schemas.microsoft.com/office/powerpoint/2010/main" val="825492111"/>
               </p:ext>
             </p:extLst>
           </p:nvPr>
@@ -3125,6 +3117,18 @@
                     <a:lstStyle/>
                     <a:p>
                       <a:pPr algn="ctr"/>
+                      <a:r>
+                        <a:rPr lang="en-US" sz="700" dirty="0">
+                          <a:solidFill>
+                            <a:schemeClr val="tx1">
+                              <a:lumMod val="95000"/>
+                              <a:lumOff val="5000"/>
+                            </a:schemeClr>
+                          </a:solidFill>
+                          <a:latin typeface="Avenir Next LT Pro Demi" panose="020B0704020202020204" pitchFamily="34" charset="0"/>
+                        </a:rPr>
+                        <a:t>Hyperparameter</a:t>
+                      </a:r>
                       <a:endParaRPr lang="en-GB" sz="700" dirty="0">
                         <a:solidFill>
                           <a:schemeClr val="tx1">
@@ -3150,6 +3154,18 @@
                     <a:lstStyle/>
                     <a:p>
                       <a:pPr algn="ctr"/>
+                      <a:r>
+                        <a:rPr lang="en-US" sz="700" dirty="0">
+                          <a:solidFill>
+                            <a:schemeClr val="tx1">
+                              <a:lumMod val="95000"/>
+                              <a:lumOff val="5000"/>
+                            </a:schemeClr>
+                          </a:solidFill>
+                          <a:latin typeface="Avenir Next LT Pro Demi" panose="020B0704020202020204" pitchFamily="34" charset="0"/>
+                        </a:rPr>
+                        <a:t>Meaning</a:t>
+                      </a:r>
                       <a:endParaRPr lang="en-GB" sz="700" dirty="0">
                         <a:solidFill>
                           <a:schemeClr val="tx1">
@@ -3191,6 +3207,18 @@
                         <a:tabLst/>
                         <a:defRPr/>
                       </a:pPr>
+                      <a:r>
+                        <a:rPr lang="en-US" sz="700">
+                          <a:solidFill>
+                            <a:schemeClr val="tx1">
+                              <a:lumMod val="95000"/>
+                              <a:lumOff val="5000"/>
+                            </a:schemeClr>
+                          </a:solidFill>
+                          <a:latin typeface="Avenir Next LT Pro Demi" panose="020B0704020202020204" pitchFamily="34" charset="0"/>
+                        </a:rPr>
+                        <a:t>Value</a:t>
+                      </a:r>
                       <a:endParaRPr lang="en-GB" sz="700" dirty="0">
                         <a:solidFill>
                           <a:schemeClr val="tx1">

</xml_diff>